<commit_message>
add overfitting, streamline slides
</commit_message>
<xml_diff>
--- a/Slides/An Investigation.pptx
+++ b/Slides/An Investigation.pptx
@@ -5,7 +5,7 @@
     <p:sldMasterId id="2147483689" r:id="rId1"/>
   </p:sldMasterIdLst>
   <p:notesMasterIdLst>
-    <p:notesMasterId r:id="rId48"/>
+    <p:notesMasterId r:id="rId46"/>
   </p:notesMasterIdLst>
   <p:sldIdLst>
     <p:sldId id="256" r:id="rId2"/>
@@ -42,18 +42,16 @@
     <p:sldId id="290" r:id="rId33"/>
     <p:sldId id="291" r:id="rId34"/>
     <p:sldId id="293" r:id="rId35"/>
-    <p:sldId id="294" r:id="rId36"/>
-    <p:sldId id="295" r:id="rId37"/>
-    <p:sldId id="296" r:id="rId38"/>
-    <p:sldId id="297" r:id="rId39"/>
-    <p:sldId id="307" r:id="rId40"/>
-    <p:sldId id="309" r:id="rId41"/>
-    <p:sldId id="308" r:id="rId42"/>
-    <p:sldId id="310" r:id="rId43"/>
-    <p:sldId id="260" r:id="rId44"/>
-    <p:sldId id="314" r:id="rId45"/>
-    <p:sldId id="313" r:id="rId46"/>
-    <p:sldId id="311" r:id="rId47"/>
+    <p:sldId id="295" r:id="rId36"/>
+    <p:sldId id="296" r:id="rId37"/>
+    <p:sldId id="297" r:id="rId38"/>
+    <p:sldId id="307" r:id="rId39"/>
+    <p:sldId id="308" r:id="rId40"/>
+    <p:sldId id="310" r:id="rId41"/>
+    <p:sldId id="260" r:id="rId42"/>
+    <p:sldId id="314" r:id="rId43"/>
+    <p:sldId id="313" r:id="rId44"/>
+    <p:sldId id="311" r:id="rId45"/>
   </p:sldIdLst>
   <p:sldSz cx="12192000" cy="6858000"/>
   <p:notesSz cx="6858000" cy="9144000"/>
@@ -754,7 +752,7 @@
           <a:p>
             <a:fld id="{DD64920E-5384-4F8F-B917-AD70FEF637A3}" type="slidenum">
               <a:rPr lang="en-US" smtClean="0"/>
-              <a:t>31</a:t>
+              <a:t>26</a:t>
             </a:fld>
             <a:endParaRPr lang="en-US"/>
           </a:p>
@@ -763,7 +761,7 @@
     </p:spTree>
     <p:extLst>
       <p:ext uri="{BB962C8B-B14F-4D97-AF65-F5344CB8AC3E}">
-        <p14:creationId xmlns:p14="http://schemas.microsoft.com/office/powerpoint/2010/main" val="2628881268"/>
+        <p14:creationId xmlns:p14="http://schemas.microsoft.com/office/powerpoint/2010/main" val="2623946945"/>
       </p:ext>
     </p:extLst>
   </p:cSld>
@@ -838,7 +836,91 @@
           <a:p>
             <a:fld id="{DD64920E-5384-4F8F-B917-AD70FEF637A3}" type="slidenum">
               <a:rPr lang="en-US" smtClean="0"/>
-              <a:t>38</a:t>
+              <a:t>31</a:t>
+            </a:fld>
+            <a:endParaRPr lang="en-US"/>
+          </a:p>
+        </p:txBody>
+      </p:sp>
+    </p:spTree>
+    <p:extLst>
+      <p:ext uri="{BB962C8B-B14F-4D97-AF65-F5344CB8AC3E}">
+        <p14:creationId xmlns:p14="http://schemas.microsoft.com/office/powerpoint/2010/main" val="2628881268"/>
+      </p:ext>
+    </p:extLst>
+  </p:cSld>
+  <p:clrMapOvr>
+    <a:masterClrMapping/>
+  </p:clrMapOvr>
+</p:notes>
+</file>
+
+<file path=ppt/notesSlides/notesSlide5.xml><?xml version="1.0" encoding="utf-8"?>
+<p:notes xmlns:a="http://schemas.openxmlformats.org/drawingml/2006/main" xmlns:r="http://schemas.openxmlformats.org/officeDocument/2006/relationships" xmlns:p="http://schemas.openxmlformats.org/presentationml/2006/main">
+  <p:cSld>
+    <p:spTree>
+      <p:nvGrpSpPr>
+        <p:cNvPr id="1" name=""/>
+        <p:cNvGrpSpPr/>
+        <p:nvPr/>
+      </p:nvGrpSpPr>
+      <p:grpSpPr>
+        <a:xfrm>
+          <a:off x="0" y="0"/>
+          <a:ext cx="0" cy="0"/>
+          <a:chOff x="0" y="0"/>
+          <a:chExt cx="0" cy="0"/>
+        </a:xfrm>
+      </p:grpSpPr>
+      <p:sp>
+        <p:nvSpPr>
+          <p:cNvPr id="2" name="Slide Image Placeholder 1"/>
+          <p:cNvSpPr>
+            <a:spLocks noGrp="1" noRot="1" noChangeAspect="1"/>
+          </p:cNvSpPr>
+          <p:nvPr>
+            <p:ph type="sldImg"/>
+          </p:nvPr>
+        </p:nvSpPr>
+        <p:spPr/>
+      </p:sp>
+      <p:sp>
+        <p:nvSpPr>
+          <p:cNvPr id="3" name="Notes Placeholder 2"/>
+          <p:cNvSpPr>
+            <a:spLocks noGrp="1"/>
+          </p:cNvSpPr>
+          <p:nvPr>
+            <p:ph type="body" idx="1"/>
+          </p:nvPr>
+        </p:nvSpPr>
+        <p:spPr/>
+        <p:txBody>
+          <a:bodyPr/>
+          <a:lstStyle/>
+          <a:p>
+            <a:endParaRPr lang="en-US" dirty="0"/>
+          </a:p>
+        </p:txBody>
+      </p:sp>
+      <p:sp>
+        <p:nvSpPr>
+          <p:cNvPr id="4" name="Slide Number Placeholder 3"/>
+          <p:cNvSpPr>
+            <a:spLocks noGrp="1"/>
+          </p:cNvSpPr>
+          <p:nvPr>
+            <p:ph type="sldNum" sz="quarter" idx="5"/>
+          </p:nvPr>
+        </p:nvSpPr>
+        <p:spPr/>
+        <p:txBody>
+          <a:bodyPr/>
+          <a:lstStyle/>
+          <a:p>
+            <a:fld id="{DD64920E-5384-4F8F-B917-AD70FEF637A3}" type="slidenum">
+              <a:rPr lang="en-US" smtClean="0"/>
+              <a:t>37</a:t>
             </a:fld>
             <a:endParaRPr lang="en-US"/>
           </a:p>
@@ -9282,7 +9364,7 @@
           </p:nvPr>
         </p:nvPicPr>
         <p:blipFill>
-          <a:blip r:embed="rId2"/>
+          <a:blip r:embed="rId3"/>
           <a:stretch>
             <a:fillRect/>
           </a:stretch>
@@ -9312,7 +9394,7 @@
           <p:nvPr/>
         </p:nvPicPr>
         <p:blipFill>
-          <a:blip r:embed="rId3"/>
+          <a:blip r:embed="rId4"/>
           <a:stretch>
             <a:fillRect/>
           </a:stretch>
@@ -9901,7 +9983,7 @@
             <a:pPr lvl="1"/>
             <a:r>
               <a:rPr lang="en-US" dirty="0"/>
-              <a:t>Drivers were charged with DUI/DWI, but the Alcohol column indicated NO</a:t>
+              <a:t>Drivers were charged with DUI, but the Alcohol column indicated NO</a:t>
             </a:r>
           </a:p>
           <a:p>
@@ -9923,26 +10005,6 @@
             <a:r>
               <a:rPr lang="en-US" dirty="0"/>
               <a:t>No data on vehicle passengers/pedestrians involved in the crash</a:t>
-            </a:r>
-          </a:p>
-          <a:p>
-            <a:r>
-              <a:rPr lang="en-US" dirty="0"/>
-              <a:t>Lack of a standard format</a:t>
-            </a:r>
-          </a:p>
-          <a:p>
-            <a:pPr lvl="1"/>
-            <a:r>
-              <a:rPr lang="en-US" dirty="0"/>
-              <a:t>Violation info was sometimes entered by a human</a:t>
-            </a:r>
-          </a:p>
-          <a:p>
-            <a:pPr lvl="2"/>
-            <a:r>
-              <a:rPr lang="en-US" dirty="0"/>
-              <a:t>Descriptions sometimes included spelling errors</a:t>
             </a:r>
           </a:p>
           <a:p>
@@ -10503,21 +10565,7 @@
             <a:pPr lvl="2"/>
             <a:r>
               <a:rPr lang="en-US" dirty="0"/>
-              <a:t>Pretty fast!</a:t>
-            </a:r>
-          </a:p>
-          <a:p>
-            <a:pPr lvl="1"/>
-            <a:r>
-              <a:rPr lang="en-US" dirty="0"/>
-              <a:t>Decision Stump</a:t>
-            </a:r>
-          </a:p>
-          <a:p>
-            <a:pPr lvl="2"/>
-            <a:r>
-              <a:rPr lang="en-US" dirty="0"/>
-              <a:t>One level decision tree</a:t>
+              <a:t>Pretty fast! </a:t>
             </a:r>
           </a:p>
           <a:p>
@@ -10803,157 +10851,6 @@
           <p:cNvPr id="3" name="Content Placeholder 2">
             <a:extLst>
               <a:ext uri="{FF2B5EF4-FFF2-40B4-BE49-F238E27FC236}">
-                <a16:creationId xmlns:a16="http://schemas.microsoft.com/office/drawing/2014/main" id="{2C84F94A-2B40-49EC-972C-93BC3D7714E1}"/>
-              </a:ext>
-            </a:extLst>
-          </p:cNvPr>
-          <p:cNvSpPr>
-            <a:spLocks noGrp="1"/>
-          </p:cNvSpPr>
-          <p:nvPr>
-            <p:ph idx="1"/>
-          </p:nvPr>
-        </p:nvSpPr>
-        <p:spPr/>
-        <p:txBody>
-          <a:bodyPr/>
-          <a:lstStyle/>
-          <a:p>
-            <a:r>
-              <a:rPr lang="en-US" dirty="0"/>
-              <a:t>Decision Stump</a:t>
-            </a:r>
-          </a:p>
-          <a:p>
-            <a:pPr lvl="1"/>
-            <a:r>
-              <a:rPr lang="en-US" dirty="0"/>
-              <a:t>29.2% correct classified, 70.8% incorrectly classified</a:t>
-            </a:r>
-          </a:p>
-          <a:p>
-            <a:pPr lvl="1"/>
-            <a:r>
-              <a:rPr lang="en-US" dirty="0"/>
-              <a:t>Recall = .292</a:t>
-            </a:r>
-          </a:p>
-          <a:p>
-            <a:pPr lvl="1"/>
-            <a:r>
-              <a:rPr lang="en-US" dirty="0"/>
-              <a:t>Can be improved</a:t>
-            </a:r>
-          </a:p>
-        </p:txBody>
-      </p:sp>
-      <p:pic>
-        <p:nvPicPr>
-          <p:cNvPr id="2" name="Picture 1">
-            <a:extLst>
-              <a:ext uri="{FF2B5EF4-FFF2-40B4-BE49-F238E27FC236}">
-                <a16:creationId xmlns:a16="http://schemas.microsoft.com/office/drawing/2014/main" id="{A7504D72-74B9-435D-A43B-515958D49785}"/>
-              </a:ext>
-            </a:extLst>
-          </p:cNvPr>
-          <p:cNvPicPr>
-            <a:picLocks noChangeAspect="1"/>
-          </p:cNvPicPr>
-          <p:nvPr/>
-        </p:nvPicPr>
-        <p:blipFill>
-          <a:blip r:embed="rId2"/>
-          <a:stretch>
-            <a:fillRect/>
-          </a:stretch>
-        </p:blipFill>
-        <p:spPr>
-          <a:xfrm>
-            <a:off x="3905163" y="3284565"/>
-            <a:ext cx="7984945" cy="2667348"/>
-          </a:xfrm>
-          <a:prstGeom prst="rect">
-            <a:avLst/>
-          </a:prstGeom>
-        </p:spPr>
-      </p:pic>
-      <p:sp>
-        <p:nvSpPr>
-          <p:cNvPr id="15" name="Title 1">
-            <a:extLst>
-              <a:ext uri="{FF2B5EF4-FFF2-40B4-BE49-F238E27FC236}">
-                <a16:creationId xmlns:a16="http://schemas.microsoft.com/office/drawing/2014/main" id="{80C51760-CB3B-4A8E-9210-F678211BA676}"/>
-              </a:ext>
-            </a:extLst>
-          </p:cNvPr>
-          <p:cNvSpPr>
-            <a:spLocks noGrp="1"/>
-          </p:cNvSpPr>
-          <p:nvPr>
-            <p:ph type="title"/>
-          </p:nvPr>
-        </p:nvSpPr>
-        <p:spPr>
-          <a:xfrm>
-            <a:off x="677333" y="609600"/>
-            <a:ext cx="9155155" cy="1320800"/>
-          </a:xfrm>
-        </p:spPr>
-        <p:txBody>
-          <a:bodyPr>
-            <a:normAutofit/>
-          </a:bodyPr>
-          <a:lstStyle/>
-          <a:p>
-            <a:r>
-              <a:rPr lang="en-US" dirty="0"/>
-              <a:t>Traffic Crashes – Evaluation/Interpretation</a:t>
-            </a:r>
-            <a:br>
-              <a:rPr lang="en-US" dirty="0"/>
-            </a:br>
-            <a:r>
-              <a:rPr lang="en-US" dirty="0"/>
-              <a:t>Results of Classification (Training)</a:t>
-            </a:r>
-          </a:p>
-        </p:txBody>
-      </p:sp>
-    </p:spTree>
-    <p:extLst>
-      <p:ext uri="{BB962C8B-B14F-4D97-AF65-F5344CB8AC3E}">
-        <p14:creationId xmlns:p14="http://schemas.microsoft.com/office/powerpoint/2010/main" val="932303325"/>
-      </p:ext>
-    </p:extLst>
-  </p:cSld>
-  <p:clrMapOvr>
-    <a:masterClrMapping/>
-  </p:clrMapOvr>
-</p:sld>
-</file>
-
-<file path=ppt/slides/slide36.xml><?xml version="1.0" encoding="utf-8"?>
-<p:sld xmlns:a="http://schemas.openxmlformats.org/drawingml/2006/main" xmlns:r="http://schemas.openxmlformats.org/officeDocument/2006/relationships" xmlns:p="http://schemas.openxmlformats.org/presentationml/2006/main">
-  <p:cSld>
-    <p:spTree>
-      <p:nvGrpSpPr>
-        <p:cNvPr id="1" name=""/>
-        <p:cNvGrpSpPr/>
-        <p:nvPr/>
-      </p:nvGrpSpPr>
-      <p:grpSpPr>
-        <a:xfrm>
-          <a:off x="0" y="0"/>
-          <a:ext cx="0" cy="0"/>
-          <a:chOff x="0" y="0"/>
-          <a:chExt cx="0" cy="0"/>
-        </a:xfrm>
-      </p:grpSpPr>
-      <p:sp>
-        <p:nvSpPr>
-          <p:cNvPr id="3" name="Content Placeholder 2">
-            <a:extLst>
-              <a:ext uri="{FF2B5EF4-FFF2-40B4-BE49-F238E27FC236}">
                 <a16:creationId xmlns:a16="http://schemas.microsoft.com/office/drawing/2014/main" id="{7A5A1B61-D05F-4843-821A-81A355FF1740}"/>
               </a:ext>
             </a:extLst>
@@ -11100,7 +10997,7 @@
 </p:sld>
 </file>
 
-<file path=ppt/slides/slide37.xml><?xml version="1.0" encoding="utf-8"?>
+<file path=ppt/slides/slide36.xml><?xml version="1.0" encoding="utf-8"?>
 <p:sld xmlns:a="http://schemas.openxmlformats.org/drawingml/2006/main" xmlns:r="http://schemas.openxmlformats.org/officeDocument/2006/relationships" xmlns:p="http://schemas.openxmlformats.org/presentationml/2006/main">
   <p:cSld>
     <p:spTree>
@@ -11268,7 +11165,7 @@
 </p:sld>
 </file>
 
-<file path=ppt/slides/slide38.xml><?xml version="1.0" encoding="utf-8"?>
+<file path=ppt/slides/slide37.xml><?xml version="1.0" encoding="utf-8"?>
 <p:sld xmlns:a="http://schemas.openxmlformats.org/drawingml/2006/main" xmlns:r="http://schemas.openxmlformats.org/officeDocument/2006/relationships" xmlns:p="http://schemas.openxmlformats.org/presentationml/2006/main">
   <p:cSld>
     <p:spTree>
@@ -11422,7 +11319,7 @@
 </p:sld>
 </file>
 
-<file path=ppt/slides/slide39.xml><?xml version="1.0" encoding="utf-8"?>
+<file path=ppt/slides/slide38.xml><?xml version="1.0" encoding="utf-8"?>
 <p:sld xmlns:a="http://schemas.openxmlformats.org/drawingml/2006/main" xmlns:r="http://schemas.openxmlformats.org/officeDocument/2006/relationships" xmlns:p="http://schemas.openxmlformats.org/presentationml/2006/main">
   <p:cSld>
     <p:spTree>
@@ -11554,6 +11451,147 @@
     <p:extLst>
       <p:ext uri="{BB962C8B-B14F-4D97-AF65-F5344CB8AC3E}">
         <p14:creationId xmlns:p14="http://schemas.microsoft.com/office/powerpoint/2010/main" val="283337453"/>
+      </p:ext>
+    </p:extLst>
+  </p:cSld>
+  <p:clrMapOvr>
+    <a:masterClrMapping/>
+  </p:clrMapOvr>
+</p:sld>
+</file>
+
+<file path=ppt/slides/slide39.xml><?xml version="1.0" encoding="utf-8"?>
+<p:sld xmlns:a="http://schemas.openxmlformats.org/drawingml/2006/main" xmlns:r="http://schemas.openxmlformats.org/officeDocument/2006/relationships" xmlns:p="http://schemas.openxmlformats.org/presentationml/2006/main">
+  <p:cSld>
+    <p:spTree>
+      <p:nvGrpSpPr>
+        <p:cNvPr id="1" name=""/>
+        <p:cNvGrpSpPr/>
+        <p:nvPr/>
+      </p:nvGrpSpPr>
+      <p:grpSpPr>
+        <a:xfrm>
+          <a:off x="0" y="0"/>
+          <a:ext cx="0" cy="0"/>
+          <a:chOff x="0" y="0"/>
+          <a:chExt cx="0" cy="0"/>
+        </a:xfrm>
+      </p:grpSpPr>
+      <p:sp>
+        <p:nvSpPr>
+          <p:cNvPr id="2" name="Title 1">
+            <a:extLst>
+              <a:ext uri="{FF2B5EF4-FFF2-40B4-BE49-F238E27FC236}">
+                <a16:creationId xmlns:a16="http://schemas.microsoft.com/office/drawing/2014/main" id="{EEC0BFB7-2A8E-40B2-91C8-D1AA77EE33B5}"/>
+              </a:ext>
+            </a:extLst>
+          </p:cNvPr>
+          <p:cNvSpPr>
+            <a:spLocks noGrp="1"/>
+          </p:cNvSpPr>
+          <p:nvPr>
+            <p:ph type="title"/>
+          </p:nvPr>
+        </p:nvSpPr>
+        <p:spPr/>
+        <p:txBody>
+          <a:bodyPr/>
+          <a:lstStyle/>
+          <a:p>
+            <a:r>
+              <a:rPr lang="en-US" dirty="0"/>
+              <a:t>Random Tree</a:t>
+            </a:r>
+          </a:p>
+        </p:txBody>
+      </p:sp>
+      <p:sp>
+        <p:nvSpPr>
+          <p:cNvPr id="3" name="Content Placeholder 2">
+            <a:extLst>
+              <a:ext uri="{FF2B5EF4-FFF2-40B4-BE49-F238E27FC236}">
+                <a16:creationId xmlns:a16="http://schemas.microsoft.com/office/drawing/2014/main" id="{DD7D4540-752E-42D7-8B67-E3C83618E10B}"/>
+              </a:ext>
+            </a:extLst>
+          </p:cNvPr>
+          <p:cNvSpPr>
+            <a:spLocks noGrp="1"/>
+          </p:cNvSpPr>
+          <p:nvPr>
+            <p:ph idx="1"/>
+          </p:nvPr>
+        </p:nvSpPr>
+        <p:spPr/>
+        <p:txBody>
+          <a:bodyPr/>
+          <a:lstStyle/>
+          <a:p>
+            <a:pPr lvl="1"/>
+            <a:r>
+              <a:rPr lang="en-US" dirty="0"/>
+              <a:t>78.7% correct classified, 21.3% incorrectly classified</a:t>
+            </a:r>
+          </a:p>
+          <a:p>
+            <a:pPr lvl="1"/>
+            <a:r>
+              <a:rPr lang="en-US" dirty="0"/>
+              <a:t>Precision = .876</a:t>
+            </a:r>
+          </a:p>
+          <a:p>
+            <a:pPr lvl="1"/>
+            <a:r>
+              <a:rPr lang="en-US" dirty="0"/>
+              <a:t>Recall = .787</a:t>
+            </a:r>
+          </a:p>
+          <a:p>
+            <a:pPr lvl="1"/>
+            <a:r>
+              <a:rPr lang="en-US" dirty="0"/>
+              <a:t>F Measure = .828</a:t>
+            </a:r>
+          </a:p>
+          <a:p>
+            <a:endParaRPr lang="en-US" dirty="0"/>
+          </a:p>
+        </p:txBody>
+      </p:sp>
+      <p:pic>
+        <p:nvPicPr>
+          <p:cNvPr id="4" name="Picture 3">
+            <a:extLst>
+              <a:ext uri="{FF2B5EF4-FFF2-40B4-BE49-F238E27FC236}">
+                <a16:creationId xmlns:a16="http://schemas.microsoft.com/office/drawing/2014/main" id="{73FC919A-5644-4402-935C-BA8705F86635}"/>
+              </a:ext>
+            </a:extLst>
+          </p:cNvPr>
+          <p:cNvPicPr>
+            <a:picLocks noChangeAspect="1"/>
+          </p:cNvPicPr>
+          <p:nvPr/>
+        </p:nvPicPr>
+        <p:blipFill>
+          <a:blip r:embed="rId2"/>
+          <a:stretch>
+            <a:fillRect/>
+          </a:stretch>
+        </p:blipFill>
+        <p:spPr>
+          <a:xfrm>
+            <a:off x="4154457" y="3137188"/>
+            <a:ext cx="7847333" cy="2748222"/>
+          </a:xfrm>
+          <a:prstGeom prst="rect">
+            <a:avLst/>
+          </a:prstGeom>
+        </p:spPr>
+      </p:pic>
+    </p:spTree>
+    <p:extLst>
+      <p:ext uri="{BB962C8B-B14F-4D97-AF65-F5344CB8AC3E}">
+        <p14:creationId xmlns:p14="http://schemas.microsoft.com/office/powerpoint/2010/main" val="2723678165"/>
       </p:ext>
     </p:extLst>
   </p:cSld>
@@ -11804,274 +11842,6 @@
           <p:cNvPr id="2" name="Title 1">
             <a:extLst>
               <a:ext uri="{FF2B5EF4-FFF2-40B4-BE49-F238E27FC236}">
-                <a16:creationId xmlns:a16="http://schemas.microsoft.com/office/drawing/2014/main" id="{E10FA47F-27B1-466C-9EF3-61339A233E53}"/>
-              </a:ext>
-            </a:extLst>
-          </p:cNvPr>
-          <p:cNvSpPr>
-            <a:spLocks noGrp="1"/>
-          </p:cNvSpPr>
-          <p:nvPr>
-            <p:ph type="title"/>
-          </p:nvPr>
-        </p:nvSpPr>
-        <p:spPr/>
-        <p:txBody>
-          <a:bodyPr/>
-          <a:lstStyle/>
-          <a:p>
-            <a:r>
-              <a:rPr lang="en-US" dirty="0"/>
-              <a:t>Decision Stump</a:t>
-            </a:r>
-          </a:p>
-        </p:txBody>
-      </p:sp>
-      <p:sp>
-        <p:nvSpPr>
-          <p:cNvPr id="3" name="Content Placeholder 2">
-            <a:extLst>
-              <a:ext uri="{FF2B5EF4-FFF2-40B4-BE49-F238E27FC236}">
-                <a16:creationId xmlns:a16="http://schemas.microsoft.com/office/drawing/2014/main" id="{99F2473E-5D1B-440B-8088-C3FCA5C74956}"/>
-              </a:ext>
-            </a:extLst>
-          </p:cNvPr>
-          <p:cNvSpPr>
-            <a:spLocks noGrp="1"/>
-          </p:cNvSpPr>
-          <p:nvPr>
-            <p:ph idx="1"/>
-          </p:nvPr>
-        </p:nvSpPr>
-        <p:spPr/>
-        <p:txBody>
-          <a:bodyPr/>
-          <a:lstStyle/>
-          <a:p>
-            <a:pPr lvl="1"/>
-            <a:r>
-              <a:rPr lang="en-US" dirty="0"/>
-              <a:t>77.1% correct classified, 22.9% incorrectly classified</a:t>
-            </a:r>
-          </a:p>
-          <a:p>
-            <a:pPr lvl="1"/>
-            <a:r>
-              <a:rPr lang="en-US" dirty="0"/>
-              <a:t>Recall = .771</a:t>
-            </a:r>
-          </a:p>
-          <a:p>
-            <a:endParaRPr lang="en-US" dirty="0"/>
-          </a:p>
-        </p:txBody>
-      </p:sp>
-      <p:pic>
-        <p:nvPicPr>
-          <p:cNvPr id="4" name="Picture 3">
-            <a:extLst>
-              <a:ext uri="{FF2B5EF4-FFF2-40B4-BE49-F238E27FC236}">
-                <a16:creationId xmlns:a16="http://schemas.microsoft.com/office/drawing/2014/main" id="{DB3AE3C3-C0D4-48E3-AF6D-810D2B3521AC}"/>
-              </a:ext>
-            </a:extLst>
-          </p:cNvPr>
-          <p:cNvPicPr>
-            <a:picLocks noChangeAspect="1"/>
-          </p:cNvPicPr>
-          <p:nvPr/>
-        </p:nvPicPr>
-        <p:blipFill>
-          <a:blip r:embed="rId2"/>
-          <a:stretch>
-            <a:fillRect/>
-          </a:stretch>
-        </p:blipFill>
-        <p:spPr>
-          <a:xfrm>
-            <a:off x="4307004" y="3429000"/>
-            <a:ext cx="7265884" cy="2401305"/>
-          </a:xfrm>
-          <a:prstGeom prst="rect">
-            <a:avLst/>
-          </a:prstGeom>
-        </p:spPr>
-      </p:pic>
-    </p:spTree>
-    <p:extLst>
-      <p:ext uri="{BB962C8B-B14F-4D97-AF65-F5344CB8AC3E}">
-        <p14:creationId xmlns:p14="http://schemas.microsoft.com/office/powerpoint/2010/main" val="918238741"/>
-      </p:ext>
-    </p:extLst>
-  </p:cSld>
-  <p:clrMapOvr>
-    <a:masterClrMapping/>
-  </p:clrMapOvr>
-</p:sld>
-</file>
-
-<file path=ppt/slides/slide41.xml><?xml version="1.0" encoding="utf-8"?>
-<p:sld xmlns:a="http://schemas.openxmlformats.org/drawingml/2006/main" xmlns:r="http://schemas.openxmlformats.org/officeDocument/2006/relationships" xmlns:p="http://schemas.openxmlformats.org/presentationml/2006/main">
-  <p:cSld>
-    <p:spTree>
-      <p:nvGrpSpPr>
-        <p:cNvPr id="1" name=""/>
-        <p:cNvGrpSpPr/>
-        <p:nvPr/>
-      </p:nvGrpSpPr>
-      <p:grpSpPr>
-        <a:xfrm>
-          <a:off x="0" y="0"/>
-          <a:ext cx="0" cy="0"/>
-          <a:chOff x="0" y="0"/>
-          <a:chExt cx="0" cy="0"/>
-        </a:xfrm>
-      </p:grpSpPr>
-      <p:sp>
-        <p:nvSpPr>
-          <p:cNvPr id="2" name="Title 1">
-            <a:extLst>
-              <a:ext uri="{FF2B5EF4-FFF2-40B4-BE49-F238E27FC236}">
-                <a16:creationId xmlns:a16="http://schemas.microsoft.com/office/drawing/2014/main" id="{EEC0BFB7-2A8E-40B2-91C8-D1AA77EE33B5}"/>
-              </a:ext>
-            </a:extLst>
-          </p:cNvPr>
-          <p:cNvSpPr>
-            <a:spLocks noGrp="1"/>
-          </p:cNvSpPr>
-          <p:nvPr>
-            <p:ph type="title"/>
-          </p:nvPr>
-        </p:nvSpPr>
-        <p:spPr/>
-        <p:txBody>
-          <a:bodyPr/>
-          <a:lstStyle/>
-          <a:p>
-            <a:r>
-              <a:rPr lang="en-US" dirty="0"/>
-              <a:t>Random Tree</a:t>
-            </a:r>
-          </a:p>
-        </p:txBody>
-      </p:sp>
-      <p:sp>
-        <p:nvSpPr>
-          <p:cNvPr id="3" name="Content Placeholder 2">
-            <a:extLst>
-              <a:ext uri="{FF2B5EF4-FFF2-40B4-BE49-F238E27FC236}">
-                <a16:creationId xmlns:a16="http://schemas.microsoft.com/office/drawing/2014/main" id="{DD7D4540-752E-42D7-8B67-E3C83618E10B}"/>
-              </a:ext>
-            </a:extLst>
-          </p:cNvPr>
-          <p:cNvSpPr>
-            <a:spLocks noGrp="1"/>
-          </p:cNvSpPr>
-          <p:nvPr>
-            <p:ph idx="1"/>
-          </p:nvPr>
-        </p:nvSpPr>
-        <p:spPr/>
-        <p:txBody>
-          <a:bodyPr/>
-          <a:lstStyle/>
-          <a:p>
-            <a:pPr lvl="1"/>
-            <a:r>
-              <a:rPr lang="en-US" dirty="0"/>
-              <a:t>78.7% correct classified, 21.3% incorrectly classified</a:t>
-            </a:r>
-          </a:p>
-          <a:p>
-            <a:pPr lvl="1"/>
-            <a:r>
-              <a:rPr lang="en-US" dirty="0"/>
-              <a:t>Precision = .876</a:t>
-            </a:r>
-          </a:p>
-          <a:p>
-            <a:pPr lvl="1"/>
-            <a:r>
-              <a:rPr lang="en-US" dirty="0"/>
-              <a:t>Recall = .787</a:t>
-            </a:r>
-          </a:p>
-          <a:p>
-            <a:pPr lvl="1"/>
-            <a:r>
-              <a:rPr lang="en-US" dirty="0"/>
-              <a:t>F Measure = .828</a:t>
-            </a:r>
-          </a:p>
-          <a:p>
-            <a:endParaRPr lang="en-US" dirty="0"/>
-          </a:p>
-        </p:txBody>
-      </p:sp>
-      <p:pic>
-        <p:nvPicPr>
-          <p:cNvPr id="4" name="Picture 3">
-            <a:extLst>
-              <a:ext uri="{FF2B5EF4-FFF2-40B4-BE49-F238E27FC236}">
-                <a16:creationId xmlns:a16="http://schemas.microsoft.com/office/drawing/2014/main" id="{73FC919A-5644-4402-935C-BA8705F86635}"/>
-              </a:ext>
-            </a:extLst>
-          </p:cNvPr>
-          <p:cNvPicPr>
-            <a:picLocks noChangeAspect="1"/>
-          </p:cNvPicPr>
-          <p:nvPr/>
-        </p:nvPicPr>
-        <p:blipFill>
-          <a:blip r:embed="rId2"/>
-          <a:stretch>
-            <a:fillRect/>
-          </a:stretch>
-        </p:blipFill>
-        <p:spPr>
-          <a:xfrm>
-            <a:off x="4154457" y="3137188"/>
-            <a:ext cx="7847333" cy="2748222"/>
-          </a:xfrm>
-          <a:prstGeom prst="rect">
-            <a:avLst/>
-          </a:prstGeom>
-        </p:spPr>
-      </p:pic>
-    </p:spTree>
-    <p:extLst>
-      <p:ext uri="{BB962C8B-B14F-4D97-AF65-F5344CB8AC3E}">
-        <p14:creationId xmlns:p14="http://schemas.microsoft.com/office/powerpoint/2010/main" val="2723678165"/>
-      </p:ext>
-    </p:extLst>
-  </p:cSld>
-  <p:clrMapOvr>
-    <a:masterClrMapping/>
-  </p:clrMapOvr>
-</p:sld>
-</file>
-
-<file path=ppt/slides/slide42.xml><?xml version="1.0" encoding="utf-8"?>
-<p:sld xmlns:a="http://schemas.openxmlformats.org/drawingml/2006/main" xmlns:r="http://schemas.openxmlformats.org/officeDocument/2006/relationships" xmlns:p="http://schemas.openxmlformats.org/presentationml/2006/main">
-  <p:cSld>
-    <p:spTree>
-      <p:nvGrpSpPr>
-        <p:cNvPr id="1" name=""/>
-        <p:cNvGrpSpPr/>
-        <p:nvPr/>
-      </p:nvGrpSpPr>
-      <p:grpSpPr>
-        <a:xfrm>
-          <a:off x="0" y="0"/>
-          <a:ext cx="0" cy="0"/>
-          <a:chOff x="0" y="0"/>
-          <a:chExt cx="0" cy="0"/>
-        </a:xfrm>
-      </p:grpSpPr>
-      <p:sp>
-        <p:nvSpPr>
-          <p:cNvPr id="2" name="Title 1">
-            <a:extLst>
-              <a:ext uri="{FF2B5EF4-FFF2-40B4-BE49-F238E27FC236}">
                 <a16:creationId xmlns:a16="http://schemas.microsoft.com/office/drawing/2014/main" id="{A6AFD214-47DA-4272-9735-43B11E7836BF}"/>
               </a:ext>
             </a:extLst>
@@ -12191,7 +11961,7 @@
 </p:sld>
 </file>
 
-<file path=ppt/slides/slide43.xml><?xml version="1.0" encoding="utf-8"?>
+<file path=ppt/slides/slide41.xml><?xml version="1.0" encoding="utf-8"?>
 <p:sld xmlns:a="http://schemas.openxmlformats.org/drawingml/2006/main" xmlns:r="http://schemas.openxmlformats.org/officeDocument/2006/relationships" xmlns:p="http://schemas.openxmlformats.org/presentationml/2006/main">
   <p:cSld>
     <p:spTree>
@@ -12299,7 +12069,7 @@
             </a:pPr>
             <a:r>
               <a:rPr lang="en-US" sz="2400" b="1" dirty="0"/>
-              <a:t>Nabil: Naïve Bayes (F-Score 0.64)</a:t>
+              <a:t>Naïve Bayes (F-Score 0.64)</a:t>
             </a:r>
           </a:p>
         </p:txBody>
@@ -12317,7 +12087,7 @@
 </p:sld>
 </file>
 
-<file path=ppt/slides/slide44.xml><?xml version="1.0" encoding="utf-8"?>
+<file path=ppt/slides/slide42.xml><?xml version="1.0" encoding="utf-8"?>
 <p:sld xmlns:a="http://schemas.openxmlformats.org/drawingml/2006/main" xmlns:r="http://schemas.openxmlformats.org/officeDocument/2006/relationships" xmlns:p="http://schemas.openxmlformats.org/presentationml/2006/main">
   <p:cSld>
     <p:spTree>
@@ -12395,7 +12165,7 @@
             </a:pPr>
             <a:r>
               <a:rPr lang="en-US" sz="2400" b="1" dirty="0"/>
-              <a:t>Hamza: Random Forest (F-Score 0.88)</a:t>
+              <a:t>Random Forest (F-Score 0.88)</a:t>
             </a:r>
           </a:p>
         </p:txBody>
@@ -12443,7 +12213,7 @@
 </p:sld>
 </file>
 
-<file path=ppt/slides/slide45.xml><?xml version="1.0" encoding="utf-8"?>
+<file path=ppt/slides/slide43.xml><?xml version="1.0" encoding="utf-8"?>
 <p:sld xmlns:a="http://schemas.openxmlformats.org/drawingml/2006/main" xmlns:r="http://schemas.openxmlformats.org/officeDocument/2006/relationships" xmlns:p="http://schemas.openxmlformats.org/presentationml/2006/main">
   <p:cSld>
     <p:spTree>
@@ -12516,6 +12286,12 @@
           <a:p>
             <a:r>
               <a:rPr lang="en-US" dirty="0"/>
+              <a:t>Overall. overfitting didn’t occur as it worked on never seen before 2017 data</a:t>
+            </a:r>
+          </a:p>
+          <a:p>
+            <a:r>
+              <a:rPr lang="en-US" dirty="0"/>
               <a:t>Results were very interesting and some were surprising</a:t>
             </a:r>
           </a:p>
@@ -12529,12 +12305,8 @@
           <a:p>
             <a:pPr lvl="1"/>
             <a:r>
-              <a:rPr lang="en-US"/>
-              <a:t>Possible explanation: </a:t>
-            </a:r>
-            <a:r>
-              <a:rPr lang="en-US" dirty="0"/>
-              <a:t>Laws work</a:t>
+              <a:rPr lang="en-US" dirty="0"/>
+              <a:t>Possible explanation: Laws work</a:t>
             </a:r>
           </a:p>
           <a:p>
@@ -12585,7 +12357,7 @@
 </p:sld>
 </file>
 
-<file path=ppt/slides/slide46.xml><?xml version="1.0" encoding="utf-8"?>
+<file path=ppt/slides/slide44.xml><?xml version="1.0" encoding="utf-8"?>
 <p:sld xmlns:a="http://schemas.openxmlformats.org/drawingml/2006/main" xmlns:r="http://schemas.openxmlformats.org/officeDocument/2006/relationships" xmlns:p="http://schemas.openxmlformats.org/presentationml/2006/main">
   <p:cSld>
     <p:spTree>

</xml_diff>

<commit_message>
finish section 2 in the report. add acknowledgement. add format for sources.
</commit_message>
<xml_diff>
--- a/Slides/An Investigation.pptx
+++ b/Slides/An Investigation.pptx
@@ -649,10 +649,7 @@
           <a:bodyPr/>
           <a:lstStyle/>
           <a:p>
-            <a:r>
-              <a:rPr lang="en-US" dirty="0"/>
-              <a:t>6:30</a:t>
-            </a:r>
+            <a:endParaRPr lang="en-US" dirty="0"/>
           </a:p>
         </p:txBody>
       </p:sp>
@@ -673,7 +670,7 @@
           <a:p>
             <a:fld id="{DD64920E-5384-4F8F-B917-AD70FEF637A3}" type="slidenum">
               <a:rPr lang="en-US" smtClean="0"/>
-              <a:t>30</a:t>
+              <a:t>29</a:t>
             </a:fld>
             <a:endParaRPr lang="en-US"/>
           </a:p>
@@ -682,7 +679,7 @@
     </p:spTree>
     <p:extLst>
       <p:ext uri="{BB962C8B-B14F-4D97-AF65-F5344CB8AC3E}">
-        <p14:creationId xmlns:p14="http://schemas.microsoft.com/office/powerpoint/2010/main" val="4156105331"/>
+        <p14:creationId xmlns:p14="http://schemas.microsoft.com/office/powerpoint/2010/main" val="2628881268"/>
       </p:ext>
     </p:extLst>
   </p:cSld>
@@ -736,7 +733,10 @@
           <a:bodyPr/>
           <a:lstStyle/>
           <a:p>
-            <a:endParaRPr lang="en-US" dirty="0"/>
+            <a:r>
+              <a:rPr lang="en-US" dirty="0"/>
+              <a:t>6:30</a:t>
+            </a:r>
           </a:p>
         </p:txBody>
       </p:sp>
@@ -757,7 +757,7 @@
           <a:p>
             <a:fld id="{DD64920E-5384-4F8F-B917-AD70FEF637A3}" type="slidenum">
               <a:rPr lang="en-US" smtClean="0"/>
-              <a:t>35</a:t>
+              <a:t>30</a:t>
             </a:fld>
             <a:endParaRPr lang="en-US"/>
           </a:p>
@@ -766,7 +766,7 @@
     </p:spTree>
     <p:extLst>
       <p:ext uri="{BB962C8B-B14F-4D97-AF65-F5344CB8AC3E}">
-        <p14:creationId xmlns:p14="http://schemas.microsoft.com/office/powerpoint/2010/main" val="2049605612"/>
+        <p14:creationId xmlns:p14="http://schemas.microsoft.com/office/powerpoint/2010/main" val="4156105331"/>
       </p:ext>
     </p:extLst>
   </p:cSld>
@@ -820,10 +820,7 @@
           <a:bodyPr/>
           <a:lstStyle/>
           <a:p>
-            <a:r>
-              <a:rPr lang="en-US" dirty="0"/>
-              <a:t>8 minutes</a:t>
-            </a:r>
+            <a:endParaRPr lang="en-US" dirty="0"/>
           </a:p>
         </p:txBody>
       </p:sp>
@@ -844,7 +841,7 @@
           <a:p>
             <a:fld id="{DD64920E-5384-4F8F-B917-AD70FEF637A3}" type="slidenum">
               <a:rPr lang="en-US" smtClean="0"/>
-              <a:t>38</a:t>
+              <a:t>35</a:t>
             </a:fld>
             <a:endParaRPr lang="en-US"/>
           </a:p>
@@ -853,7 +850,7 @@
     </p:spTree>
     <p:extLst>
       <p:ext uri="{BB962C8B-B14F-4D97-AF65-F5344CB8AC3E}">
-        <p14:creationId xmlns:p14="http://schemas.microsoft.com/office/powerpoint/2010/main" val="3066518556"/>
+        <p14:creationId xmlns:p14="http://schemas.microsoft.com/office/powerpoint/2010/main" val="2049605612"/>
       </p:ext>
     </p:extLst>
   </p:cSld>
@@ -909,7 +906,7 @@
           <a:p>
             <a:r>
               <a:rPr lang="en-US" dirty="0"/>
-              <a:t>9 minutes</a:t>
+              <a:t>8 minutes</a:t>
             </a:r>
           </a:p>
         </p:txBody>
@@ -931,7 +928,7 @@
           <a:p>
             <a:fld id="{DD64920E-5384-4F8F-B917-AD70FEF637A3}" type="slidenum">
               <a:rPr lang="en-US" smtClean="0"/>
-              <a:t>40</a:t>
+              <a:t>38</a:t>
             </a:fld>
             <a:endParaRPr lang="en-US"/>
           </a:p>
@@ -940,7 +937,7 @@
     </p:spTree>
     <p:extLst>
       <p:ext uri="{BB962C8B-B14F-4D97-AF65-F5344CB8AC3E}">
-        <p14:creationId xmlns:p14="http://schemas.microsoft.com/office/powerpoint/2010/main" val="242961623"/>
+        <p14:creationId xmlns:p14="http://schemas.microsoft.com/office/powerpoint/2010/main" val="3066518556"/>
       </p:ext>
     </p:extLst>
   </p:cSld>
@@ -994,6 +991,93 @@
           <a:bodyPr/>
           <a:lstStyle/>
           <a:p>
+            <a:r>
+              <a:rPr lang="en-US" dirty="0"/>
+              <a:t>9 minutes</a:t>
+            </a:r>
+          </a:p>
+        </p:txBody>
+      </p:sp>
+      <p:sp>
+        <p:nvSpPr>
+          <p:cNvPr id="4" name="Slide Number Placeholder 3"/>
+          <p:cNvSpPr>
+            <a:spLocks noGrp="1"/>
+          </p:cNvSpPr>
+          <p:nvPr>
+            <p:ph type="sldNum" sz="quarter" idx="5"/>
+          </p:nvPr>
+        </p:nvSpPr>
+        <p:spPr/>
+        <p:txBody>
+          <a:bodyPr/>
+          <a:lstStyle/>
+          <a:p>
+            <a:fld id="{DD64920E-5384-4F8F-B917-AD70FEF637A3}" type="slidenum">
+              <a:rPr lang="en-US" smtClean="0"/>
+              <a:t>40</a:t>
+            </a:fld>
+            <a:endParaRPr lang="en-US"/>
+          </a:p>
+        </p:txBody>
+      </p:sp>
+    </p:spTree>
+    <p:extLst>
+      <p:ext uri="{BB962C8B-B14F-4D97-AF65-F5344CB8AC3E}">
+        <p14:creationId xmlns:p14="http://schemas.microsoft.com/office/powerpoint/2010/main" val="242961623"/>
+      </p:ext>
+    </p:extLst>
+  </p:cSld>
+  <p:clrMapOvr>
+    <a:masterClrMapping/>
+  </p:clrMapOvr>
+</p:notes>
+</file>
+
+<file path=ppt/notesSlides/notesSlide15.xml><?xml version="1.0" encoding="utf-8"?>
+<p:notes xmlns:a="http://schemas.openxmlformats.org/drawingml/2006/main" xmlns:r="http://schemas.openxmlformats.org/officeDocument/2006/relationships" xmlns:p="http://schemas.openxmlformats.org/presentationml/2006/main">
+  <p:cSld>
+    <p:spTree>
+      <p:nvGrpSpPr>
+        <p:cNvPr id="1" name=""/>
+        <p:cNvGrpSpPr/>
+        <p:nvPr/>
+      </p:nvGrpSpPr>
+      <p:grpSpPr>
+        <a:xfrm>
+          <a:off x="0" y="0"/>
+          <a:ext cx="0" cy="0"/>
+          <a:chOff x="0" y="0"/>
+          <a:chExt cx="0" cy="0"/>
+        </a:xfrm>
+      </p:grpSpPr>
+      <p:sp>
+        <p:nvSpPr>
+          <p:cNvPr id="2" name="Slide Image Placeholder 1"/>
+          <p:cNvSpPr>
+            <a:spLocks noGrp="1" noRot="1" noChangeAspect="1"/>
+          </p:cNvSpPr>
+          <p:nvPr>
+            <p:ph type="sldImg"/>
+          </p:nvPr>
+        </p:nvSpPr>
+        <p:spPr/>
+      </p:sp>
+      <p:sp>
+        <p:nvSpPr>
+          <p:cNvPr id="3" name="Notes Placeholder 2"/>
+          <p:cNvSpPr>
+            <a:spLocks noGrp="1"/>
+          </p:cNvSpPr>
+          <p:nvPr>
+            <p:ph type="body" idx="1"/>
+          </p:nvPr>
+        </p:nvSpPr>
+        <p:spPr/>
+        <p:txBody>
+          <a:bodyPr/>
+          <a:lstStyle/>
+          <a:p>
             <a:endParaRPr lang="en-US" dirty="0"/>
           </a:p>
         </p:txBody>
@@ -1034,7 +1118,7 @@
 </p:notes>
 </file>
 
-<file path=ppt/notesSlides/notesSlide15.xml><?xml version="1.0" encoding="utf-8"?>
+<file path=ppt/notesSlides/notesSlide16.xml><?xml version="1.0" encoding="utf-8"?>
 <p:notes xmlns:a="http://schemas.openxmlformats.org/drawingml/2006/main" xmlns:r="http://schemas.openxmlformats.org/officeDocument/2006/relationships" xmlns:p="http://schemas.openxmlformats.org/presentationml/2006/main">
   <p:cSld>
     <p:spTree>
@@ -1440,10 +1524,7 @@
           <a:bodyPr/>
           <a:lstStyle/>
           <a:p>
-            <a:r>
-              <a:rPr lang="en-US" dirty="0"/>
-              <a:t>4:30</a:t>
-            </a:r>
+            <a:endParaRPr lang="en-US" dirty="0"/>
           </a:p>
         </p:txBody>
       </p:sp>
@@ -1527,10 +1608,30 @@
           <a:bodyPr/>
           <a:lstStyle/>
           <a:p>
-            <a:r>
-              <a:rPr lang="en-US" dirty="0"/>
-              <a:t>5:30 minutes</a:t>
-            </a:r>
+            <a:pPr marL="0" marR="0" lvl="0" indent="0" algn="l" defTabSz="914400" rtl="0" eaLnBrk="1" fontAlgn="auto" latinLnBrk="0" hangingPunct="1">
+              <a:lnSpc>
+                <a:spcPct val="100000"/>
+              </a:lnSpc>
+              <a:spcBef>
+                <a:spcPts val="0"/>
+              </a:spcBef>
+              <a:spcAft>
+                <a:spcPts val="0"/>
+              </a:spcAft>
+              <a:buClrTx/>
+              <a:buSzTx/>
+              <a:buFontTx/>
+              <a:buNone/>
+              <a:tabLst/>
+              <a:defRPr/>
+            </a:pPr>
+            <a:r>
+              <a:rPr lang="en-US" dirty="0"/>
+              <a:t>4:30</a:t>
+            </a:r>
+          </a:p>
+          <a:p>
+            <a:endParaRPr lang="en-US" dirty="0"/>
           </a:p>
         </p:txBody>
       </p:sp>
@@ -1551,7 +1652,7 @@
           <a:p>
             <a:fld id="{DD64920E-5384-4F8F-B917-AD70FEF637A3}" type="slidenum">
               <a:rPr lang="en-US" smtClean="0"/>
-              <a:t>23</a:t>
+              <a:t>22</a:t>
             </a:fld>
             <a:endParaRPr lang="en-US"/>
           </a:p>
@@ -1560,7 +1661,7 @@
     </p:spTree>
     <p:extLst>
       <p:ext uri="{BB962C8B-B14F-4D97-AF65-F5344CB8AC3E}">
-        <p14:creationId xmlns:p14="http://schemas.microsoft.com/office/powerpoint/2010/main" val="1700299795"/>
+        <p14:creationId xmlns:p14="http://schemas.microsoft.com/office/powerpoint/2010/main" val="3875343146"/>
       </p:ext>
     </p:extLst>
   </p:cSld>
@@ -1635,7 +1736,7 @@
           <a:p>
             <a:fld id="{DD64920E-5384-4F8F-B917-AD70FEF637A3}" type="slidenum">
               <a:rPr lang="en-US" smtClean="0"/>
-              <a:t>24</a:t>
+              <a:t>23</a:t>
             </a:fld>
             <a:endParaRPr lang="en-US"/>
           </a:p>
@@ -1644,7 +1745,7 @@
     </p:spTree>
     <p:extLst>
       <p:ext uri="{BB962C8B-B14F-4D97-AF65-F5344CB8AC3E}">
-        <p14:creationId xmlns:p14="http://schemas.microsoft.com/office/powerpoint/2010/main" val="2623946945"/>
+        <p14:creationId xmlns:p14="http://schemas.microsoft.com/office/powerpoint/2010/main" val="1700299795"/>
       </p:ext>
     </p:extLst>
   </p:cSld>
@@ -1698,10 +1799,7 @@
           <a:bodyPr/>
           <a:lstStyle/>
           <a:p>
-            <a:r>
-              <a:rPr lang="en-US" dirty="0"/>
-              <a:t>5:30</a:t>
-            </a:r>
+            <a:endParaRPr lang="en-US" dirty="0"/>
           </a:p>
         </p:txBody>
       </p:sp>
@@ -1722,7 +1820,7 @@
           <a:p>
             <a:fld id="{DD64920E-5384-4F8F-B917-AD70FEF637A3}" type="slidenum">
               <a:rPr lang="en-US" smtClean="0"/>
-              <a:t>27</a:t>
+              <a:t>24</a:t>
             </a:fld>
             <a:endParaRPr lang="en-US"/>
           </a:p>
@@ -1731,7 +1829,7 @@
     </p:spTree>
     <p:extLst>
       <p:ext uri="{BB962C8B-B14F-4D97-AF65-F5344CB8AC3E}">
-        <p14:creationId xmlns:p14="http://schemas.microsoft.com/office/powerpoint/2010/main" val="4019406322"/>
+        <p14:creationId xmlns:p14="http://schemas.microsoft.com/office/powerpoint/2010/main" val="2623946945"/>
       </p:ext>
     </p:extLst>
   </p:cSld>
@@ -1787,7 +1885,7 @@
           <a:p>
             <a:r>
               <a:rPr lang="en-US" dirty="0"/>
-              <a:t>6:00 minutes</a:t>
+              <a:t>5:30</a:t>
             </a:r>
           </a:p>
         </p:txBody>
@@ -1809,7 +1907,7 @@
           <a:p>
             <a:fld id="{DD64920E-5384-4F8F-B917-AD70FEF637A3}" type="slidenum">
               <a:rPr lang="en-US" smtClean="0"/>
-              <a:t>29</a:t>
+              <a:t>27</a:t>
             </a:fld>
             <a:endParaRPr lang="en-US"/>
           </a:p>
@@ -1818,7 +1916,7 @@
     </p:spTree>
     <p:extLst>
       <p:ext uri="{BB962C8B-B14F-4D97-AF65-F5344CB8AC3E}">
-        <p14:creationId xmlns:p14="http://schemas.microsoft.com/office/powerpoint/2010/main" val="2628881268"/>
+        <p14:creationId xmlns:p14="http://schemas.microsoft.com/office/powerpoint/2010/main" val="4019406322"/>
       </p:ext>
     </p:extLst>
   </p:cSld>

</xml_diff>